<commit_message>
se creo un nuevo ejemplo sustituyendo el anteriror y por el lado de las diapositivas se corrigio el tema de la medicon de heuristicas
</commit_message>
<xml_diff>
--- a/ConsistenciayEstandares.pptx
+++ b/ConsistenciayEstandares.pptx
@@ -618,7 +618,7 @@
           <a:p>
             <a:fld id="{F04CCAA0-0D9C-4758-925F-C90F7C8FAC99}" type="datetimeFigureOut">
               <a:rPr lang="es-CO" smtClean="0"/>
-              <a:t>8/05/2024</a:t>
+              <a:t>15/05/2024</a:t>
             </a:fld>
             <a:endParaRPr lang="es-CO"/>
           </a:p>
@@ -948,7 +948,7 @@
           <a:p>
             <a:fld id="{F04CCAA0-0D9C-4758-925F-C90F7C8FAC99}" type="datetimeFigureOut">
               <a:rPr lang="es-CO" smtClean="0"/>
-              <a:t>8/05/2024</a:t>
+              <a:t>15/05/2024</a:t>
             </a:fld>
             <a:endParaRPr lang="es-CO"/>
           </a:p>
@@ -1128,7 +1128,7 @@
           <a:p>
             <a:fld id="{F04CCAA0-0D9C-4758-925F-C90F7C8FAC99}" type="datetimeFigureOut">
               <a:rPr lang="es-CO" smtClean="0"/>
-              <a:t>8/05/2024</a:t>
+              <a:t>15/05/2024</a:t>
             </a:fld>
             <a:endParaRPr lang="es-CO"/>
           </a:p>
@@ -1298,7 +1298,7 @@
           <a:p>
             <a:fld id="{F04CCAA0-0D9C-4758-925F-C90F7C8FAC99}" type="datetimeFigureOut">
               <a:rPr lang="es-CO" smtClean="0"/>
-              <a:t>8/05/2024</a:t>
+              <a:t>15/05/2024</a:t>
             </a:fld>
             <a:endParaRPr lang="es-CO"/>
           </a:p>
@@ -1575,7 +1575,7 @@
           <a:p>
             <a:fld id="{F04CCAA0-0D9C-4758-925F-C90F7C8FAC99}" type="datetimeFigureOut">
               <a:rPr lang="es-CO" smtClean="0"/>
-              <a:t>8/05/2024</a:t>
+              <a:t>15/05/2024</a:t>
             </a:fld>
             <a:endParaRPr lang="es-CO"/>
           </a:p>
@@ -1969,7 +1969,7 @@
           <a:p>
             <a:fld id="{F04CCAA0-0D9C-4758-925F-C90F7C8FAC99}" type="datetimeFigureOut">
               <a:rPr lang="es-CO" smtClean="0"/>
-              <a:t>8/05/2024</a:t>
+              <a:t>15/05/2024</a:t>
             </a:fld>
             <a:endParaRPr lang="es-CO"/>
           </a:p>
@@ -2446,7 +2446,7 @@
           <a:p>
             <a:fld id="{F04CCAA0-0D9C-4758-925F-C90F7C8FAC99}" type="datetimeFigureOut">
               <a:rPr lang="es-CO" smtClean="0"/>
-              <a:t>8/05/2024</a:t>
+              <a:t>15/05/2024</a:t>
             </a:fld>
             <a:endParaRPr lang="es-CO"/>
           </a:p>
@@ -2564,7 +2564,7 @@
           <a:p>
             <a:fld id="{F04CCAA0-0D9C-4758-925F-C90F7C8FAC99}" type="datetimeFigureOut">
               <a:rPr lang="es-CO" smtClean="0"/>
-              <a:t>8/05/2024</a:t>
+              <a:t>15/05/2024</a:t>
             </a:fld>
             <a:endParaRPr lang="es-CO"/>
           </a:p>
@@ -2659,7 +2659,7 @@
           <a:p>
             <a:fld id="{F04CCAA0-0D9C-4758-925F-C90F7C8FAC99}" type="datetimeFigureOut">
               <a:rPr lang="es-CO" smtClean="0"/>
-              <a:t>8/05/2024</a:t>
+              <a:t>15/05/2024</a:t>
             </a:fld>
             <a:endParaRPr lang="es-CO"/>
           </a:p>
@@ -3005,7 +3005,7 @@
           <a:p>
             <a:fld id="{F04CCAA0-0D9C-4758-925F-C90F7C8FAC99}" type="datetimeFigureOut">
               <a:rPr lang="es-CO" smtClean="0"/>
-              <a:t>8/05/2024</a:t>
+              <a:t>15/05/2024</a:t>
             </a:fld>
             <a:endParaRPr lang="es-CO"/>
           </a:p>
@@ -3393,7 +3393,7 @@
           <a:p>
             <a:fld id="{F04CCAA0-0D9C-4758-925F-C90F7C8FAC99}" type="datetimeFigureOut">
               <a:rPr lang="es-CO" smtClean="0"/>
-              <a:t>8/05/2024</a:t>
+              <a:t>15/05/2024</a:t>
             </a:fld>
             <a:endParaRPr lang="es-CO"/>
           </a:p>
@@ -3671,7 +3671,7 @@
           <a:p>
             <a:fld id="{F04CCAA0-0D9C-4758-925F-C90F7C8FAC99}" type="datetimeFigureOut">
               <a:rPr lang="es-CO" smtClean="0"/>
-              <a:t>8/05/2024</a:t>
+              <a:t>15/05/2024</a:t>
             </a:fld>
             <a:endParaRPr lang="es-CO"/>
           </a:p>
@@ -4614,12 +4614,12 @@
         <p:spPr>
           <a:xfrm>
             <a:off x="1371599" y="1643269"/>
-            <a:ext cx="10263810" cy="4528931"/>
+            <a:ext cx="5625549" cy="5035827"/>
           </a:xfrm>
         </p:spPr>
         <p:txBody>
           <a:bodyPr>
-            <a:normAutofit lnSpcReduction="10000"/>
+            <a:normAutofit/>
           </a:bodyPr>
           <a:lstStyle/>
           <a:p>
@@ -4628,7 +4628,7 @@
             </a:pPr>
             <a:r>
               <a:rPr lang="es-MX" dirty="0"/>
-              <a:t>Las heurísticas de Nielsen establecen que la mayor parte del tiempo las personas usan productos digitales distintos al tuyo, por lo tanto sus expectativas están basadas en dichos productos. Los usuarios no deben preguntarse si diferentes situaciones o acciones significan lo mismo.</a:t>
+              <a:t>El sistema tiene que seguir unas normas coherentes y las convenciones de la plataforma para que el usuario pueda prever cómo interactuar sin necesidad de preguntarse cómo hacerlo o aprender nuevas acciones.</a:t>
             </a:r>
           </a:p>
           <a:p>
@@ -4652,32 +4652,38 @@
               <a:t>No mantener la consistencia puede aumentar la carga cognitiva de los usuarios al obligarlos a aprender algo nuevo.</a:t>
             </a:r>
           </a:p>
-          <a:p>
-            <a:pPr marL="0" indent="0" algn="just">
-              <a:buNone/>
-            </a:pPr>
-            <a:r>
-              <a:rPr lang="es-MX" dirty="0"/>
-              <a:t>Lo que quiero decir es que debes seguir patrones de diseño y convenciones comunes para que el usuario se sienta cómodo y familiarizado con la interfaz. Evita cambios bruscos o inesperados en la navegación o diseño.</a:t>
-            </a:r>
-          </a:p>
-          <a:p>
-            <a:pPr marL="0" indent="0" algn="just">
-              <a:buNone/>
-            </a:pPr>
-            <a:r>
-              <a:rPr lang="es-MX" dirty="0"/>
-              <a:t>Seguir las convenciones establecidas por la industria dentro del sector puede ayudar al aprendizaje del usuario o cliente.</a:t>
-            </a:r>
-          </a:p>
-          <a:p>
-            <a:pPr marL="0" indent="0" algn="just">
-              <a:buNone/>
-            </a:pPr>
-            <a:endParaRPr lang="es-MX" dirty="0"/>
-          </a:p>
-        </p:txBody>
-      </p:sp>
+        </p:txBody>
+      </p:sp>
+      <p:pic>
+        <p:nvPicPr>
+          <p:cNvPr id="4" name="Imagen 3">
+            <a:extLst>
+              <a:ext uri="{FF2B5EF4-FFF2-40B4-BE49-F238E27FC236}">
+                <a16:creationId xmlns:a16="http://schemas.microsoft.com/office/drawing/2014/main" id="{2A6B1732-DCB8-4273-AF87-B282BBAF0EC5}"/>
+              </a:ext>
+            </a:extLst>
+          </p:cNvPr>
+          <p:cNvPicPr>
+            <a:picLocks noChangeAspect="1"/>
+          </p:cNvPicPr>
+          <p:nvPr/>
+        </p:nvPicPr>
+        <p:blipFill>
+          <a:blip r:embed="rId2"/>
+          <a:stretch>
+            <a:fillRect/>
+          </a:stretch>
+        </p:blipFill>
+        <p:spPr>
+          <a:xfrm>
+            <a:off x="7169426" y="2345162"/>
+            <a:ext cx="4649027" cy="2641043"/>
+          </a:xfrm>
+          <a:prstGeom prst="rect">
+            <a:avLst/>
+          </a:prstGeom>
+        </p:spPr>
+      </p:pic>
     </p:spTree>
     <p:extLst>
       <p:ext uri="{BB962C8B-B14F-4D97-AF65-F5344CB8AC3E}">
@@ -4788,10 +4794,10 @@
       </p:sp>
       <p:pic>
         <p:nvPicPr>
-          <p:cNvPr id="4" name="Imagen 3">
+          <p:cNvPr id="5" name="Imagen 4">
             <a:extLst>
               <a:ext uri="{FF2B5EF4-FFF2-40B4-BE49-F238E27FC236}">
-                <a16:creationId xmlns:a16="http://schemas.microsoft.com/office/drawing/2014/main" id="{926C1335-6FC3-4C28-B163-51DF9A0FC0C1}"/>
+                <a16:creationId xmlns:a16="http://schemas.microsoft.com/office/drawing/2014/main" id="{F743DA19-BB28-4148-BB2C-80A1DBAEAFF0}"/>
               </a:ext>
             </a:extLst>
           </p:cNvPr>
@@ -4800,91 +4806,16 @@
           </p:cNvPicPr>
           <p:nvPr/>
         </p:nvPicPr>
-        <p:blipFill rotWithShape="1">
-          <a:blip r:embed="rId2">
-            <a:extLst>
-              <a:ext uri="{BEBA8EAE-BF5A-486C-A8C5-ECC9F3942E4B}">
-                <a14:imgProps xmlns:a14="http://schemas.microsoft.com/office/drawing/2010/main">
-                  <a14:imgLayer r:embed="rId3">
-                    <a14:imgEffect>
-                      <a14:backgroundRemoval t="21989" b="77247" l="15100" r="86300">
-                        <a14:foregroundMark x1="68000" y1="41683" x2="80800" y2="36711"/>
-                        <a14:foregroundMark x1="69800" y1="33843" x2="65500" y2="42447"/>
-                        <a14:foregroundMark x1="68900" y1="50287" x2="66700" y2="34608"/>
-                        <a14:foregroundMark x1="66700" y1="34608" x2="69500" y2="34034"/>
-                        <a14:foregroundMark x1="84800" y1="32505" x2="84200" y2="48375"/>
-                        <a14:foregroundMark x1="68100" y1="30210" x2="60900" y2="46463"/>
-                        <a14:foregroundMark x1="60900" y1="46463" x2="62300" y2="53346"/>
-                        <a14:foregroundMark x1="64100" y1="30593" x2="59900" y2="59847"/>
-                        <a14:foregroundMark x1="59900" y1="59847" x2="68000" y2="71511"/>
-                        <a14:foregroundMark x1="68000" y1="71511" x2="76600" y2="70554"/>
-                        <a14:foregroundMark x1="76600" y1="70554" x2="82900" y2="61377"/>
-                        <a14:foregroundMark x1="82900" y1="61377" x2="83400" y2="59656"/>
-                        <a14:foregroundMark x1="86200" y1="42639" x2="86300" y2="59273"/>
-                        <a14:foregroundMark x1="83100" y1="60421" x2="70000" y2="61568"/>
-                        <a14:foregroundMark x1="74600" y1="61185" x2="65200" y2="61185"/>
-                        <a14:foregroundMark x1="68300" y1="61185" x2="64800" y2="60803"/>
-                        <a14:foregroundMark x1="66000" y1="61759" x2="66000" y2="61185"/>
-                        <a14:foregroundMark x1="66200" y1="57935" x2="65200" y2="65392"/>
-                        <a14:foregroundMark x1="66100" y1="76864" x2="68800" y2="77247"/>
-                        <a14:foregroundMark x1="76200" y1="41491" x2="74800" y2="43403"/>
-                        <a14:foregroundMark x1="81300" y1="61185" x2="80500" y2="53920"/>
-                        <a14:foregroundMark x1="64700" y1="57553" x2="65100" y2="66730"/>
-                        <a14:foregroundMark x1="36200" y1="33270" x2="17500" y2="44551"/>
-                        <a14:foregroundMark x1="17500" y1="44551" x2="19300" y2="68260"/>
-                        <a14:foregroundMark x1="19300" y1="68260" x2="27900" y2="74952"/>
-                        <a14:foregroundMark x1="27900" y1="74952" x2="36700" y2="71319"/>
-                        <a14:foregroundMark x1="36700" y1="71319" x2="40500" y2="38432"/>
-                        <a14:foregroundMark x1="40500" y1="38432" x2="33700" y2="31549"/>
-                        <a14:foregroundMark x1="23600" y1="32887" x2="18400" y2="45124"/>
-                        <a14:foregroundMark x1="18400" y1="45124" x2="18600" y2="45698"/>
-                        <a14:foregroundMark x1="18400" y1="30784" x2="16500" y2="58317"/>
-                        <a14:foregroundMark x1="16500" y1="58317" x2="21900" y2="71893"/>
-                        <a14:foregroundMark x1="21900" y1="71893" x2="37200" y2="68834"/>
-                        <a14:foregroundMark x1="37200" y1="68834" x2="40500" y2="46463"/>
-                        <a14:foregroundMark x1="40500" y1="46463" x2="32400" y2="32122"/>
-                        <a14:foregroundMark x1="32400" y1="32122" x2="25000" y2="35755"/>
-                        <a14:foregroundMark x1="25000" y1="35755" x2="32400" y2="51243"/>
-                        <a14:foregroundMark x1="32400" y1="51243" x2="26400" y2="58509"/>
-                        <a14:foregroundMark x1="26400" y1="58509" x2="34500" y2="61185"/>
-                        <a14:foregroundMark x1="34500" y1="61185" x2="32600" y2="62333"/>
-                        <a14:foregroundMark x1="19200" y1="30210" x2="15100" y2="53346"/>
-                        <a14:foregroundMark x1="15100" y1="53346" x2="15100" y2="53537"/>
-                        <a14:foregroundMark x1="21600" y1="53346" x2="28100" y2="50860"/>
-                        <a14:foregroundMark x1="25700" y1="57744" x2="25100" y2="61377"/>
-                        <a14:foregroundMark x1="21800" y1="57935" x2="20900" y2="61185"/>
-                        <a14:foregroundMark x1="21100" y1="61568" x2="25500" y2="63098"/>
-                        <a14:foregroundMark x1="42600" y1="71511" x2="40800" y2="30210"/>
-                        <a14:foregroundMark x1="40800" y1="30210" x2="27400" y2="26769"/>
-                        <a14:foregroundMark x1="27400" y1="26769" x2="16500" y2="30784"/>
-                        <a14:foregroundMark x1="16500" y1="30784" x2="16400" y2="67113"/>
-                        <a14:foregroundMark x1="16400" y1="67113" x2="18300" y2="73231"/>
-                        <a14:foregroundMark x1="29300" y1="40535" x2="31800" y2="39771"/>
-                        <a14:foregroundMark x1="34200" y1="38432" x2="32600" y2="47801"/>
-                        <a14:foregroundMark x1="35000" y1="60803" x2="38000" y2="62141"/>
-                        <a14:foregroundMark x1="37600" y1="61377" x2="34300" y2="58891"/>
-                        <a14:foregroundMark x1="30700" y1="62141" x2="28300" y2="61759"/>
-                        <a14:foregroundMark x1="31100" y1="65010" x2="29200" y2="65201"/>
-                        <a14:foregroundMark x1="66000" y1="42256" x2="68300" y2="48948"/>
-                        <a14:foregroundMark x1="68800" y1="58891" x2="68600" y2="59273"/>
-                        <a14:foregroundMark x1="70200" y1="60612" x2="67400" y2="66348"/>
-                        <a14:foregroundMark x1="69900" y1="63480" x2="69900" y2="63480"/>
-                        <a14:foregroundMark x1="72600" y1="60803" x2="75000" y2="63098"/>
-                        <a14:foregroundMark x1="43500" y1="51243" x2="38800" y2="24665"/>
-                      </a14:backgroundRemoval>
-                    </a14:imgEffect>
-                  </a14:imgLayer>
-                </a14:imgProps>
-              </a:ext>
-            </a:extLst>
-          </a:blip>
-          <a:srcRect l="9506" t="15248" r="9685" b="17220"/>
-          <a:stretch/>
+        <p:blipFill>
+          <a:blip r:embed="rId2"/>
+          <a:stretch>
+            <a:fillRect/>
+          </a:stretch>
         </p:blipFill>
         <p:spPr>
           <a:xfrm>
-            <a:off x="6500189" y="2331887"/>
-            <a:ext cx="5406887" cy="2363192"/>
+            <a:off x="7459921" y="1815547"/>
+            <a:ext cx="3512879" cy="4035908"/>
           </a:xfrm>
           <a:prstGeom prst="rect">
             <a:avLst/>
@@ -5163,8 +5094,8 @@
         </p:nvSpPr>
         <p:spPr>
           <a:xfrm>
-            <a:off x="1371600" y="2349316"/>
-            <a:ext cx="5545667" cy="4144617"/>
+            <a:off x="1371600" y="2561351"/>
+            <a:ext cx="4856922" cy="2336985"/>
           </a:xfrm>
         </p:spPr>
         <p:txBody>
@@ -5182,18 +5113,6 @@
               <a:rPr lang="es-ES" dirty="0"/>
               <a:t>Una manera cuantitativa de medir o evaluar un fenómeno, su importancia  es que estas permiten comparaciones, identificar áreas de mejora y evaluar el desempeño.</a:t>
             </a:r>
-          </a:p>
-          <a:p>
-            <a:pPr algn="just"/>
-            <a:r>
-              <a:rPr lang="es-ES" b="1" dirty="0"/>
-              <a:t>Métricas de Usabilidad-Función de las métricas de usabilidad: </a:t>
-            </a:r>
-            <a:r>
-              <a:rPr lang="es-ES" dirty="0"/>
-              <a:t>Comparar con competencia y expectativas de usuarios, mejorar áreas problemáticas. Los principios de métricas (SMART) tienen como finalidad que las métricas sean: Específicas, Medibles, Alcanzables, Relevantes, Temporales.</a:t>
-            </a:r>
-            <a:endParaRPr lang="es-MX" dirty="0"/>
           </a:p>
         </p:txBody>
       </p:sp>
@@ -5242,7 +5161,7 @@
         </p:blipFill>
         <p:spPr>
           <a:xfrm>
-            <a:off x="7421217" y="2171700"/>
+            <a:off x="7268817" y="2174646"/>
             <a:ext cx="3551583" cy="3110393"/>
           </a:xfrm>
           <a:prstGeom prst="rect">
@@ -5339,158 +5258,33 @@
           <a:p>
             <a:pPr algn="just"/>
             <a:r>
-              <a:rPr lang="es-ES" b="1" dirty="0"/>
-              <a:t>Características de las Métricas de Usabilidad-Diferencia con otros tipos de métricas: </a:t>
-            </a:r>
-            <a:r>
-              <a:rPr lang="es-ES" dirty="0"/>
-              <a:t>Revelan experiencia personal del usuario y su interacción con el sistema por medio de elementos medibles como: Eficacia, eficiencia y satisfacción.</a:t>
-            </a:r>
-          </a:p>
-          <a:p>
-            <a:pPr algn="just"/>
-            <a:r>
-              <a:rPr lang="es-ES" b="1" dirty="0"/>
-              <a:t>Ejemplos de Métricas de Usabilidad:</a:t>
-            </a:r>
-          </a:p>
-          <a:p>
-            <a:pPr lvl="1" algn="just">
-              <a:lnSpc>
-                <a:spcPct val="120000"/>
-              </a:lnSpc>
-              <a:spcBef>
-                <a:spcPts val="0"/>
-              </a:spcBef>
-              <a:spcAft>
-                <a:spcPts val="0"/>
-              </a:spcAft>
+              <a:rPr lang="es-MX" i="0" dirty="0"/>
+              <a:t>Aunque las heurísticas de Nielsen no se miden directamente con valores numéricos, podemos aplicar algunos conceptos matemáticos para evaluar la usabilidad.</a:t>
+            </a:r>
+          </a:p>
+          <a:p>
+            <a:pPr algn="just">
               <a:buFont typeface="Arial" panose="020B0604020202020204" pitchFamily="34" charset="0"/>
               <a:buChar char="•"/>
             </a:pPr>
             <a:r>
-              <a:rPr lang="es-ES" i="0" dirty="0"/>
-              <a:t>Tasa</a:t>
-            </a:r>
-            <a:r>
-              <a:rPr lang="es-ES" b="1" i="0" dirty="0"/>
-              <a:t> </a:t>
-            </a:r>
-            <a:r>
-              <a:rPr lang="es-ES" i="0" dirty="0"/>
-              <a:t>de éxito de ejecución de una tarea.</a:t>
-            </a:r>
-          </a:p>
-          <a:p>
-            <a:pPr lvl="1" algn="just">
-              <a:lnSpc>
-                <a:spcPct val="120000"/>
-              </a:lnSpc>
-              <a:spcBef>
-                <a:spcPts val="0"/>
-              </a:spcBef>
-              <a:spcAft>
-                <a:spcPts val="0"/>
-              </a:spcAft>
-              <a:buFont typeface="Arial" panose="020B0604020202020204" pitchFamily="34" charset="0"/>
-              <a:buChar char="•"/>
+              <a:rPr lang="es-MX" b="1" dirty="0"/>
+              <a:t>1. Tasa de errores:</a:t>
+            </a:r>
+          </a:p>
+          <a:p>
+            <a:pPr marL="0" indent="0" algn="just">
+              <a:buNone/>
             </a:pPr>
             <a:r>
-              <a:rPr lang="es-ES" i="0" dirty="0"/>
-              <a:t>Tiempo de realización de una tarea.</a:t>
-            </a:r>
-          </a:p>
-          <a:p>
-            <a:pPr lvl="1" algn="just">
-              <a:lnSpc>
-                <a:spcPct val="120000"/>
-              </a:lnSpc>
-              <a:spcBef>
-                <a:spcPts val="0"/>
-              </a:spcBef>
-              <a:spcAft>
-                <a:spcPts val="0"/>
-              </a:spcAft>
-              <a:buFont typeface="Arial" panose="020B0604020202020204" pitchFamily="34" charset="0"/>
-              <a:buChar char="•"/>
+              <a:rPr lang="es-MX" i="0" dirty="0"/>
+              <a:t>Durante las pruebas de usuario, registra la cantidad de errores que los participantes cometen al interactuar con la interfaz. Luego, puedes calcular la tasa de errores como:</a:t>
+            </a:r>
+          </a:p>
+          <a:p>
+            <a:pPr marL="0" indent="0" algn="just">
+              <a:buNone/>
             </a:pPr>
-            <a:r>
-              <a:rPr lang="es-ES" i="0" dirty="0"/>
-              <a:t>Número de clics, </a:t>
-            </a:r>
-            <a:r>
-              <a:rPr lang="es-ES" i="0" dirty="0" err="1"/>
-              <a:t>teclazos</a:t>
-            </a:r>
-            <a:r>
-              <a:rPr lang="es-ES" i="0" dirty="0"/>
-              <a:t> o </a:t>
-            </a:r>
-            <a:r>
-              <a:rPr lang="es-ES" i="0" dirty="0" err="1"/>
-              <a:t>tabs</a:t>
-            </a:r>
-            <a:r>
-              <a:rPr lang="es-ES" i="0" dirty="0"/>
-              <a:t> durante una tarea.</a:t>
-            </a:r>
-          </a:p>
-          <a:p>
-            <a:pPr lvl="1" algn="just">
-              <a:lnSpc>
-                <a:spcPct val="120000"/>
-              </a:lnSpc>
-              <a:spcBef>
-                <a:spcPts val="0"/>
-              </a:spcBef>
-              <a:spcAft>
-                <a:spcPts val="0"/>
-              </a:spcAft>
-              <a:buFont typeface="Arial" panose="020B0604020202020204" pitchFamily="34" charset="0"/>
-              <a:buChar char="•"/>
-            </a:pPr>
-            <a:r>
-              <a:rPr lang="es-ES" i="0" dirty="0"/>
-              <a:t>Calificaciones de satisfacción o frustración.</a:t>
-            </a:r>
-          </a:p>
-          <a:p>
-            <a:pPr lvl="1" algn="just">
-              <a:lnSpc>
-                <a:spcPct val="120000"/>
-              </a:lnSpc>
-              <a:spcBef>
-                <a:spcPts val="0"/>
-              </a:spcBef>
-              <a:spcAft>
-                <a:spcPts val="0"/>
-              </a:spcAft>
-              <a:buFont typeface="Arial" panose="020B0604020202020204" pitchFamily="34" charset="0"/>
-              <a:buChar char="•"/>
-            </a:pPr>
-            <a:r>
-              <a:rPr lang="es-ES" i="0" dirty="0"/>
-              <a:t>Sentimiento de comentarios de usuarios.</a:t>
-            </a:r>
-          </a:p>
-          <a:p>
-            <a:pPr lvl="1" algn="just">
-              <a:lnSpc>
-                <a:spcPct val="120000"/>
-              </a:lnSpc>
-              <a:spcBef>
-                <a:spcPts val="0"/>
-              </a:spcBef>
-              <a:spcAft>
-                <a:spcPts val="0"/>
-              </a:spcAft>
-              <a:buFont typeface="Arial" panose="020B0604020202020204" pitchFamily="34" charset="0"/>
-              <a:buChar char="•"/>
-            </a:pPr>
-            <a:r>
-              <a:rPr lang="es-ES" i="0" dirty="0"/>
-              <a:t>Número de veces que un hipervínculo es observado.</a:t>
-            </a:r>
             <a:endParaRPr lang="es-MX" i="0" dirty="0"/>
           </a:p>
         </p:txBody>
@@ -5768,6 +5562,36 @@
           </a:p>
         </p:txBody>
       </p:sp>
+      <p:pic>
+        <p:nvPicPr>
+          <p:cNvPr id="5" name="Imagen 4">
+            <a:extLst>
+              <a:ext uri="{FF2B5EF4-FFF2-40B4-BE49-F238E27FC236}">
+                <a16:creationId xmlns:a16="http://schemas.microsoft.com/office/drawing/2014/main" id="{D1D328AA-B175-4F8A-974D-66E0A715049D}"/>
+              </a:ext>
+            </a:extLst>
+          </p:cNvPr>
+          <p:cNvPicPr>
+            <a:picLocks noChangeAspect="1"/>
+          </p:cNvPicPr>
+          <p:nvPr/>
+        </p:nvPicPr>
+        <p:blipFill>
+          <a:blip r:embed="rId8"/>
+          <a:stretch>
+            <a:fillRect/>
+          </a:stretch>
+        </p:blipFill>
+        <p:spPr>
+          <a:xfrm>
+            <a:off x="4459441" y="4732704"/>
+            <a:ext cx="6282826" cy="613291"/>
+          </a:xfrm>
+          <a:prstGeom prst="rect">
+            <a:avLst/>
+          </a:prstGeom>
+        </p:spPr>
+      </p:pic>
     </p:spTree>
     <p:extLst>
       <p:ext uri="{BB962C8B-B14F-4D97-AF65-F5344CB8AC3E}">
@@ -5845,8 +5669,8 @@
         </p:nvSpPr>
         <p:spPr>
           <a:xfrm>
-            <a:off x="6340692" y="2392327"/>
-            <a:ext cx="5103540" cy="3934046"/>
+            <a:off x="5420139" y="2332383"/>
+            <a:ext cx="6024093" cy="3993990"/>
           </a:xfrm>
         </p:spPr>
         <p:txBody>
@@ -5855,26 +5679,59 @@
           </a:bodyPr>
           <a:lstStyle/>
           <a:p>
-            <a:pPr algn="just"/>
-            <a:r>
-              <a:rPr lang="es-ES" b="1" i="0" dirty="0"/>
-              <a:t>Consideraciones y Limitaciones-Métricas de usabilidad vs. otras métricas: </a:t>
-            </a:r>
-            <a:r>
-              <a:rPr lang="es-ES" i="0" dirty="0"/>
-              <a:t>Enfoque en interacción usuario-sistema, ¿Qué no son métricas de usabilidad?: Preferencias no relacionadas con la experiencia de uso.</a:t>
-            </a:r>
-          </a:p>
-          <a:p>
-            <a:pPr algn="just"/>
-            <a:r>
-              <a:rPr lang="es-ES" b="1" i="0" dirty="0"/>
-              <a:t>Importancia de las Métricas de Usabilidad-Resolución de preguntas importantes: </a:t>
-            </a:r>
-            <a:r>
-              <a:rPr lang="es-ES" i="0" dirty="0"/>
-              <a:t>Preferencia por una versión del producto, eficiencia comparativa con la competencia.</a:t>
-            </a:r>
+            <a:pPr algn="just">
+              <a:buFont typeface="Arial" panose="020B0604020202020204" pitchFamily="34" charset="0"/>
+              <a:buChar char="•"/>
+            </a:pPr>
+            <a:r>
+              <a:rPr lang="es-MX" b="1" i="0" dirty="0"/>
+              <a:t>2. Tiempo de tarea:</a:t>
+            </a:r>
+          </a:p>
+          <a:p>
+            <a:pPr marL="0" indent="0" algn="just">
+              <a:buNone/>
+            </a:pPr>
+            <a:r>
+              <a:rPr lang="es-MX" i="0" dirty="0"/>
+              <a:t>Mide el tiempo que los usuarios tardan en completar tareas específicas. Calcula el tiempo promedio de tarea para evaluar la eficiencia:</a:t>
+            </a:r>
+          </a:p>
+          <a:p>
+            <a:pPr marL="0" indent="0" algn="just">
+              <a:buNone/>
+            </a:pPr>
+            <a:endParaRPr lang="es-MX" i="0" dirty="0"/>
+          </a:p>
+          <a:p>
+            <a:pPr marL="0" indent="0" algn="just">
+              <a:buNone/>
+            </a:pPr>
+            <a:endParaRPr lang="es-MX" dirty="0"/>
+          </a:p>
+          <a:p>
+            <a:pPr algn="just">
+              <a:buFont typeface="Arial" panose="020B0604020202020204" pitchFamily="34" charset="0"/>
+              <a:buChar char="•"/>
+            </a:pPr>
+            <a:r>
+              <a:rPr lang="es-MX" b="1" dirty="0"/>
+              <a:t>3. Satisfacción del usuario</a:t>
+            </a:r>
+          </a:p>
+          <a:p>
+            <a:pPr marL="0" indent="0" algn="just">
+              <a:buNone/>
+            </a:pPr>
+            <a:r>
+              <a:rPr lang="es-MX" i="0" dirty="0"/>
+              <a:t>Utiliza encuestas o escalas de satisfacción para obtener puntuaciones subjetivas de los usuarios.</a:t>
+            </a:r>
+          </a:p>
+          <a:p>
+            <a:pPr marL="0" indent="0" algn="just">
+              <a:buNone/>
+            </a:pPr>
             <a:endParaRPr lang="es-MX" i="0" dirty="0"/>
           </a:p>
         </p:txBody>
@@ -5901,8 +5758,68 @@
         </p:blipFill>
         <p:spPr>
           <a:xfrm>
-            <a:off x="917888" y="2518790"/>
-            <a:ext cx="5103540" cy="3183467"/>
+            <a:off x="815391" y="2691315"/>
+            <a:ext cx="4449242" cy="2778781"/>
+          </a:xfrm>
+          <a:prstGeom prst="rect">
+            <a:avLst/>
+          </a:prstGeom>
+        </p:spPr>
+      </p:pic>
+      <p:pic>
+        <p:nvPicPr>
+          <p:cNvPr id="5" name="Imagen 4">
+            <a:extLst>
+              <a:ext uri="{FF2B5EF4-FFF2-40B4-BE49-F238E27FC236}">
+                <a16:creationId xmlns:a16="http://schemas.microsoft.com/office/drawing/2014/main" id="{7F7488F3-E8B5-4DB2-99BC-5AF91FDB27D5}"/>
+              </a:ext>
+            </a:extLst>
+          </p:cNvPr>
+          <p:cNvPicPr>
+            <a:picLocks noChangeAspect="1"/>
+          </p:cNvPicPr>
+          <p:nvPr/>
+        </p:nvPicPr>
+        <p:blipFill>
+          <a:blip r:embed="rId3"/>
+          <a:stretch>
+            <a:fillRect/>
+          </a:stretch>
+        </p:blipFill>
+        <p:spPr>
+          <a:xfrm>
+            <a:off x="5830956" y="3801616"/>
+            <a:ext cx="4960412" cy="558178"/>
+          </a:xfrm>
+          <a:prstGeom prst="rect">
+            <a:avLst/>
+          </a:prstGeom>
+        </p:spPr>
+      </p:pic>
+      <p:pic>
+        <p:nvPicPr>
+          <p:cNvPr id="8" name="Imagen 7">
+            <a:extLst>
+              <a:ext uri="{FF2B5EF4-FFF2-40B4-BE49-F238E27FC236}">
+                <a16:creationId xmlns:a16="http://schemas.microsoft.com/office/drawing/2014/main" id="{B764A985-3AAF-4B52-8CD4-B4251F6689E6}"/>
+              </a:ext>
+            </a:extLst>
+          </p:cNvPr>
+          <p:cNvPicPr>
+            <a:picLocks noChangeAspect="1"/>
+          </p:cNvPicPr>
+          <p:nvPr/>
+        </p:nvPicPr>
+        <p:blipFill>
+          <a:blip r:embed="rId4"/>
+          <a:stretch>
+            <a:fillRect/>
+          </a:stretch>
+        </p:blipFill>
+        <p:spPr>
+          <a:xfrm>
+            <a:off x="5580279" y="5829027"/>
+            <a:ext cx="5703811" cy="529862"/>
           </a:xfrm>
           <a:prstGeom prst="rect">
             <a:avLst/>

</xml_diff>